<commit_message>
finished lesson 5 presentation + added lesson 5 class exercise
</commit_message>
<xml_diff>
--- a/lesson_5/Lesson5 - For Loops and Practice.pptx
+++ b/lesson_5/Lesson5 - For Loops and Practice.pptx
@@ -5,15 +5,16 @@
     <p:sldMasterId id="2147483660" r:id="rId1"/>
   </p:sldMasterIdLst>
   <p:notesMasterIdLst>
-    <p:notesMasterId r:id="rId8"/>
+    <p:notesMasterId r:id="rId9"/>
   </p:notesMasterIdLst>
   <p:sldIdLst>
     <p:sldId id="256" r:id="rId2"/>
     <p:sldId id="257" r:id="rId3"/>
     <p:sldId id="268" r:id="rId4"/>
-    <p:sldId id="258" r:id="rId5"/>
-    <p:sldId id="265" r:id="rId6"/>
-    <p:sldId id="266" r:id="rId7"/>
+    <p:sldId id="269" r:id="rId5"/>
+    <p:sldId id="258" r:id="rId6"/>
+    <p:sldId id="265" r:id="rId7"/>
+    <p:sldId id="266" r:id="rId8"/>
   </p:sldIdLst>
   <p:sldSz cx="12192000" cy="6858000"/>
   <p:notesSz cx="6858000" cy="9144000"/>
@@ -202,7 +203,7 @@
           <a:p>
             <a:fld id="{D063134C-E624-479D-8AE6-639B201674F1}" type="datetimeFigureOut">
               <a:rPr lang="en-US" smtClean="0"/>
-              <a:t>2/2/2016</a:t>
+              <a:t>2/3/2016</a:t>
             </a:fld>
             <a:endParaRPr lang="en-US"/>
           </a:p>
@@ -785,7 +786,7 @@
     </p:spTree>
     <p:extLst>
       <p:ext uri="{BB962C8B-B14F-4D97-AF65-F5344CB8AC3E}">
-        <p14:creationId xmlns:p14="http://schemas.microsoft.com/office/powerpoint/2010/main" val="3415471690"/>
+        <p14:creationId xmlns:p14="http://schemas.microsoft.com/office/powerpoint/2010/main" val="2097547640"/>
       </p:ext>
     </p:extLst>
   </p:cSld>
@@ -839,23 +840,10 @@
           <a:bodyPr/>
           <a:lstStyle/>
           <a:p>
-            <a:pPr algn="r" rtl="1"/>
-            <a:r>
-              <a:rPr lang="he-IL" dirty="0" smtClean="0"/>
-              <a:t>הסבר קצר</a:t>
-            </a:r>
-            <a:r>
-              <a:rPr lang="he-IL" baseline="0" dirty="0" smtClean="0"/>
-              <a:t> על </a:t>
-            </a:r>
-            <a:r>
-              <a:rPr lang="he-IL" baseline="0" dirty="0" smtClean="0"/>
-              <a:t>תרגיל הכיתה, </a:t>
-            </a:r>
-            <a:r>
-              <a:rPr lang="he-IL" baseline="0" dirty="0" smtClean="0"/>
-              <a:t>ועבודה</a:t>
-            </a:r>
+            <a:pPr marL="0" indent="0" algn="r" rtl="1">
+              <a:buFont typeface="Wingdings" panose="05000000000000000000" pitchFamily="2" charset="2"/>
+              <a:buNone/>
+            </a:pPr>
             <a:endParaRPr lang="en-GB" dirty="0"/>
           </a:p>
         </p:txBody>
@@ -886,7 +874,7 @@
     </p:spTree>
     <p:extLst>
       <p:ext uri="{BB962C8B-B14F-4D97-AF65-F5344CB8AC3E}">
-        <p14:creationId xmlns:p14="http://schemas.microsoft.com/office/powerpoint/2010/main" val="3127551956"/>
+        <p14:creationId xmlns:p14="http://schemas.microsoft.com/office/powerpoint/2010/main" val="3415471690"/>
       </p:ext>
     </p:extLst>
   </p:cSld>
@@ -943,7 +931,11 @@
             <a:pPr algn="r" rtl="1"/>
             <a:r>
               <a:rPr lang="he-IL" dirty="0" smtClean="0"/>
-              <a:t>בגלל שעשינו תרגיל כיתה, ובגלל שהתרגיל הפעם מאוד דומה, נציג אותה בקצרה בסיכום פשוט</a:t>
+              <a:t>הסבר קצר</a:t>
+            </a:r>
+            <a:r>
+              <a:rPr lang="he-IL" baseline="0" dirty="0" smtClean="0"/>
+              <a:t> על תרגיל הכיתה, ועבודה</a:t>
             </a:r>
             <a:endParaRPr lang="en-GB" dirty="0"/>
           </a:p>
@@ -967,6 +959,95 @@
             <a:fld id="{4C4731D5-8797-4B10-8576-164CC9E270C8}" type="slidenum">
               <a:rPr lang="en-US" smtClean="0"/>
               <a:t>6</a:t>
+            </a:fld>
+            <a:endParaRPr lang="en-US"/>
+          </a:p>
+        </p:txBody>
+      </p:sp>
+    </p:spTree>
+    <p:extLst>
+      <p:ext uri="{BB962C8B-B14F-4D97-AF65-F5344CB8AC3E}">
+        <p14:creationId xmlns:p14="http://schemas.microsoft.com/office/powerpoint/2010/main" val="3127551956"/>
+      </p:ext>
+    </p:extLst>
+  </p:cSld>
+  <p:clrMapOvr>
+    <a:masterClrMapping/>
+  </p:clrMapOvr>
+</p:notes>
+</file>
+
+<file path=ppt/notesSlides/notesSlide6.xml><?xml version="1.0" encoding="utf-8"?>
+<p:notes xmlns:a="http://schemas.openxmlformats.org/drawingml/2006/main" xmlns:r="http://schemas.openxmlformats.org/officeDocument/2006/relationships" xmlns:p="http://schemas.openxmlformats.org/presentationml/2006/main">
+  <p:cSld>
+    <p:spTree>
+      <p:nvGrpSpPr>
+        <p:cNvPr id="1" name=""/>
+        <p:cNvGrpSpPr/>
+        <p:nvPr/>
+      </p:nvGrpSpPr>
+      <p:grpSpPr>
+        <a:xfrm>
+          <a:off x="0" y="0"/>
+          <a:ext cx="0" cy="0"/>
+          <a:chOff x="0" y="0"/>
+          <a:chExt cx="0" cy="0"/>
+        </a:xfrm>
+      </p:grpSpPr>
+      <p:sp>
+        <p:nvSpPr>
+          <p:cNvPr id="2" name="Slide Image Placeholder 1"/>
+          <p:cNvSpPr>
+            <a:spLocks noGrp="1" noRot="1" noChangeAspect="1"/>
+          </p:cNvSpPr>
+          <p:nvPr>
+            <p:ph type="sldImg"/>
+          </p:nvPr>
+        </p:nvSpPr>
+        <p:spPr/>
+      </p:sp>
+      <p:sp>
+        <p:nvSpPr>
+          <p:cNvPr id="3" name="Notes Placeholder 2"/>
+          <p:cNvSpPr>
+            <a:spLocks noGrp="1"/>
+          </p:cNvSpPr>
+          <p:nvPr>
+            <p:ph type="body" idx="1"/>
+          </p:nvPr>
+        </p:nvSpPr>
+        <p:spPr/>
+        <p:txBody>
+          <a:bodyPr/>
+          <a:lstStyle/>
+          <a:p>
+            <a:pPr algn="r" rtl="1"/>
+            <a:r>
+              <a:rPr lang="he-IL" dirty="0" smtClean="0"/>
+              <a:t>בגלל שעשינו תרגיל כיתה, ובגלל שהתרגיל הפעם מאוד דומה, נציג אותה בקצרה בסיכום פשוט</a:t>
+            </a:r>
+            <a:endParaRPr lang="en-GB" dirty="0"/>
+          </a:p>
+        </p:txBody>
+      </p:sp>
+      <p:sp>
+        <p:nvSpPr>
+          <p:cNvPr id="4" name="Slide Number Placeholder 3"/>
+          <p:cNvSpPr>
+            <a:spLocks noGrp="1"/>
+          </p:cNvSpPr>
+          <p:nvPr>
+            <p:ph type="sldNum" sz="quarter" idx="10"/>
+          </p:nvPr>
+        </p:nvSpPr>
+        <p:spPr/>
+        <p:txBody>
+          <a:bodyPr/>
+          <a:lstStyle/>
+          <a:p>
+            <a:fld id="{4C4731D5-8797-4B10-8576-164CC9E270C8}" type="slidenum">
+              <a:rPr lang="en-US" smtClean="0"/>
+              <a:t>7</a:t>
             </a:fld>
             <a:endParaRPr lang="en-US"/>
           </a:p>
@@ -1171,7 +1252,7 @@
           <a:p>
             <a:fld id="{1F490A8C-D7C9-41CF-84E6-06D12254D666}" type="datetimeFigureOut">
               <a:rPr lang="en-US" smtClean="0"/>
-              <a:t>2/2/2016</a:t>
+              <a:t>2/3/2016</a:t>
             </a:fld>
             <a:endParaRPr lang="en-US"/>
           </a:p>
@@ -1446,7 +1527,7 @@
           <a:p>
             <a:fld id="{1F490A8C-D7C9-41CF-84E6-06D12254D666}" type="datetimeFigureOut">
               <a:rPr lang="en-US" smtClean="0"/>
-              <a:t>2/2/2016</a:t>
+              <a:t>2/3/2016</a:t>
             </a:fld>
             <a:endParaRPr lang="en-US"/>
           </a:p>
@@ -1640,7 +1721,7 @@
           <a:p>
             <a:fld id="{1F490A8C-D7C9-41CF-84E6-06D12254D666}" type="datetimeFigureOut">
               <a:rPr lang="en-US" smtClean="0"/>
-              <a:t>2/2/2016</a:t>
+              <a:t>2/3/2016</a:t>
             </a:fld>
             <a:endParaRPr lang="en-US"/>
           </a:p>
@@ -1913,7 +1994,7 @@
           <a:p>
             <a:fld id="{1F490A8C-D7C9-41CF-84E6-06D12254D666}" type="datetimeFigureOut">
               <a:rPr lang="en-US" smtClean="0"/>
-              <a:t>2/2/2016</a:t>
+              <a:t>2/3/2016</a:t>
             </a:fld>
             <a:endParaRPr lang="en-US"/>
           </a:p>
@@ -2254,7 +2335,7 @@
           <a:p>
             <a:fld id="{1F490A8C-D7C9-41CF-84E6-06D12254D666}" type="datetimeFigureOut">
               <a:rPr lang="en-US" smtClean="0"/>
-              <a:t>2/2/2016</a:t>
+              <a:t>2/3/2016</a:t>
             </a:fld>
             <a:endParaRPr lang="en-US"/>
           </a:p>
@@ -2877,7 +2958,7 @@
           <a:p>
             <a:fld id="{1F490A8C-D7C9-41CF-84E6-06D12254D666}" type="datetimeFigureOut">
               <a:rPr lang="en-US" smtClean="0"/>
-              <a:t>2/2/2016</a:t>
+              <a:t>2/3/2016</a:t>
             </a:fld>
             <a:endParaRPr lang="en-US"/>
           </a:p>
@@ -3737,7 +3818,7 @@
           <a:p>
             <a:fld id="{1F490A8C-D7C9-41CF-84E6-06D12254D666}" type="datetimeFigureOut">
               <a:rPr lang="en-US" smtClean="0"/>
-              <a:t>2/2/2016</a:t>
+              <a:t>2/3/2016</a:t>
             </a:fld>
             <a:endParaRPr lang="en-US"/>
           </a:p>
@@ -3907,7 +3988,7 @@
           <a:p>
             <a:fld id="{1F490A8C-D7C9-41CF-84E6-06D12254D666}" type="datetimeFigureOut">
               <a:rPr lang="en-US" smtClean="0"/>
-              <a:t>2/2/2016</a:t>
+              <a:t>2/3/2016</a:t>
             </a:fld>
             <a:endParaRPr lang="en-US"/>
           </a:p>
@@ -4087,7 +4168,7 @@
           <a:p>
             <a:fld id="{1F490A8C-D7C9-41CF-84E6-06D12254D666}" type="datetimeFigureOut">
               <a:rPr lang="en-US" smtClean="0"/>
-              <a:t>2/2/2016</a:t>
+              <a:t>2/3/2016</a:t>
             </a:fld>
             <a:endParaRPr lang="en-US"/>
           </a:p>
@@ -4257,7 +4338,7 @@
           <a:p>
             <a:fld id="{1F490A8C-D7C9-41CF-84E6-06D12254D666}" type="datetimeFigureOut">
               <a:rPr lang="en-US" smtClean="0"/>
-              <a:t>2/2/2016</a:t>
+              <a:t>2/3/2016</a:t>
             </a:fld>
             <a:endParaRPr lang="en-US"/>
           </a:p>
@@ -4504,7 +4585,7 @@
           <a:p>
             <a:fld id="{1F490A8C-D7C9-41CF-84E6-06D12254D666}" type="datetimeFigureOut">
               <a:rPr lang="en-US" smtClean="0"/>
-              <a:t>2/2/2016</a:t>
+              <a:t>2/3/2016</a:t>
             </a:fld>
             <a:endParaRPr lang="en-US"/>
           </a:p>
@@ -4796,7 +4877,7 @@
           <a:p>
             <a:fld id="{1F490A8C-D7C9-41CF-84E6-06D12254D666}" type="datetimeFigureOut">
               <a:rPr lang="en-US" smtClean="0"/>
-              <a:t>2/2/2016</a:t>
+              <a:t>2/3/2016</a:t>
             </a:fld>
             <a:endParaRPr lang="en-US"/>
           </a:p>
@@ -5240,7 +5321,7 @@
           <a:p>
             <a:fld id="{1F490A8C-D7C9-41CF-84E6-06D12254D666}" type="datetimeFigureOut">
               <a:rPr lang="en-US" smtClean="0"/>
-              <a:t>2/2/2016</a:t>
+              <a:t>2/3/2016</a:t>
             </a:fld>
             <a:endParaRPr lang="en-US"/>
           </a:p>
@@ -5358,7 +5439,7 @@
           <a:p>
             <a:fld id="{1F490A8C-D7C9-41CF-84E6-06D12254D666}" type="datetimeFigureOut">
               <a:rPr lang="en-US" smtClean="0"/>
-              <a:t>2/2/2016</a:t>
+              <a:t>2/3/2016</a:t>
             </a:fld>
             <a:endParaRPr lang="en-US"/>
           </a:p>
@@ -5453,7 +5534,7 @@
           <a:p>
             <a:fld id="{1F490A8C-D7C9-41CF-84E6-06D12254D666}" type="datetimeFigureOut">
               <a:rPr lang="en-US" smtClean="0"/>
-              <a:t>2/2/2016</a:t>
+              <a:t>2/3/2016</a:t>
             </a:fld>
             <a:endParaRPr lang="en-US"/>
           </a:p>
@@ -5732,7 +5813,7 @@
           <a:p>
             <a:fld id="{1F490A8C-D7C9-41CF-84E6-06D12254D666}" type="datetimeFigureOut">
               <a:rPr lang="en-US" smtClean="0"/>
-              <a:t>2/2/2016</a:t>
+              <a:t>2/3/2016</a:t>
             </a:fld>
             <a:endParaRPr lang="en-US"/>
           </a:p>
@@ -6007,7 +6088,7 @@
           <a:p>
             <a:fld id="{1F490A8C-D7C9-41CF-84E6-06D12254D666}" type="datetimeFigureOut">
               <a:rPr lang="en-US" smtClean="0"/>
-              <a:t>2/2/2016</a:t>
+              <a:t>2/3/2016</a:t>
             </a:fld>
             <a:endParaRPr lang="en-US"/>
           </a:p>
@@ -6436,7 +6517,7 @@
           <a:p>
             <a:fld id="{1F490A8C-D7C9-41CF-84E6-06D12254D666}" type="datetimeFigureOut">
               <a:rPr lang="en-US" smtClean="0"/>
-              <a:t>2/2/2016</a:t>
+              <a:t>2/3/2016</a:t>
             </a:fld>
             <a:endParaRPr lang="en-US"/>
           </a:p>
@@ -7116,7 +7197,6 @@
               <a:rPr lang="he-IL" dirty="0" smtClean="0"/>
               <a:t>מה השיטה שבעזרתה פתרתם את השלבים?</a:t>
             </a:r>
-            <a:endParaRPr lang="he-IL" dirty="0" smtClean="0"/>
           </a:p>
           <a:p>
             <a:pPr algn="r" rtl="1"/>
@@ -7220,6 +7300,163 @@
           <a:lstStyle/>
           <a:p>
             <a:pPr algn="r" rtl="1"/>
+            <a:r>
+              <a:rPr lang="he-IL" dirty="0" smtClean="0"/>
+              <a:t>הרבה פעמים התנאי שנרצה לשים בלולאה הוא מספר הפעמים שהלולאה רצה</a:t>
+            </a:r>
+          </a:p>
+          <a:p>
+            <a:pPr lvl="1" algn="r" rtl="1"/>
+            <a:r>
+              <a:rPr lang="he-IL" dirty="0" smtClean="0"/>
+              <a:t>"תצייר צלע כל עוד ציירת פחות מארבע צלעות"</a:t>
+            </a:r>
+          </a:p>
+          <a:p>
+            <a:pPr lvl="1" algn="r" rtl="1"/>
+            <a:r>
+              <a:rPr lang="he-IL" dirty="0" smtClean="0"/>
+              <a:t>"תצייר ריבוע כל עוד ציירת פחות מעשרה ריבועים"</a:t>
+            </a:r>
+          </a:p>
+          <a:p>
+            <a:pPr algn="r" rtl="1"/>
+            <a:r>
+              <a:rPr lang="he-IL" dirty="0" smtClean="0"/>
+              <a:t>בגלל שזה נפוץ, יש דרך נוחה לעשות בדיוק את זה – להגיד ללולאה לרוץ מספר </a:t>
+            </a:r>
+            <a:r>
+              <a:rPr lang="he-IL" dirty="0" err="1" smtClean="0"/>
+              <a:t>מסויים</a:t>
+            </a:r>
+            <a:r>
+              <a:rPr lang="he-IL" dirty="0" smtClean="0"/>
+              <a:t> של פעמים:</a:t>
+            </a:r>
+          </a:p>
+          <a:p>
+            <a:pPr lvl="1" algn="l"/>
+            <a:r>
+              <a:rPr lang="en-US" dirty="0" smtClean="0"/>
+              <a:t>for(&lt;</a:t>
+            </a:r>
+            <a:r>
+              <a:rPr lang="he-IL" dirty="0" smtClean="0"/>
+              <a:t>אתחול הספירה</a:t>
+            </a:r>
+            <a:r>
+              <a:rPr lang="en-US" dirty="0" smtClean="0"/>
+              <a:t> </a:t>
+            </a:r>
+            <a:r>
+              <a:rPr lang="he-IL" dirty="0" smtClean="0"/>
+              <a:t>&lt;</a:t>
+            </a:r>
+            <a:r>
+              <a:rPr lang="en-US" dirty="0" smtClean="0"/>
+              <a:t>; &lt;</a:t>
+            </a:r>
+            <a:r>
+              <a:rPr lang="he-IL" dirty="0" smtClean="0"/>
+              <a:t>הגדרת תנאי הספירה</a:t>
+            </a:r>
+            <a:r>
+              <a:rPr lang="en-US" dirty="0" smtClean="0"/>
+              <a:t>&gt;; &lt;</a:t>
+            </a:r>
+            <a:r>
+              <a:rPr lang="he-IL" dirty="0" smtClean="0"/>
+              <a:t>הגדרת צעד הספירה</a:t>
+            </a:r>
+            <a:r>
+              <a:rPr lang="en-US" dirty="0" smtClean="0"/>
+              <a:t>&gt;)</a:t>
+            </a:r>
+          </a:p>
+          <a:p>
+            <a:pPr lvl="1" algn="r" rtl="1"/>
+            <a:r>
+              <a:rPr lang="he-IL" dirty="0" smtClean="0"/>
+              <a:t>לדוגמא:</a:t>
+            </a:r>
+          </a:p>
+          <a:p>
+            <a:pPr lvl="1" algn="l"/>
+            <a:r>
+              <a:rPr lang="en-US" dirty="0" smtClean="0"/>
+              <a:t>for(</a:t>
+            </a:r>
+            <a:r>
+              <a:rPr lang="en-US" dirty="0" err="1" smtClean="0"/>
+              <a:t>int</a:t>
+            </a:r>
+            <a:r>
+              <a:rPr lang="en-US" dirty="0" smtClean="0"/>
+              <a:t> </a:t>
+            </a:r>
+            <a:r>
+              <a:rPr lang="en-US" dirty="0" err="1" smtClean="0"/>
+              <a:t>i</a:t>
+            </a:r>
+            <a:r>
+              <a:rPr lang="en-US" dirty="0" smtClean="0"/>
+              <a:t> = 0; </a:t>
+            </a:r>
+            <a:r>
+              <a:rPr lang="en-US" dirty="0" err="1" smtClean="0"/>
+              <a:t>i</a:t>
+            </a:r>
+            <a:r>
+              <a:rPr lang="en-US" dirty="0" smtClean="0"/>
+              <a:t> &lt; 5; </a:t>
+            </a:r>
+            <a:r>
+              <a:rPr lang="en-US" dirty="0" err="1" smtClean="0"/>
+              <a:t>i</a:t>
+            </a:r>
+            <a:r>
+              <a:rPr lang="en-US" dirty="0" smtClean="0"/>
+              <a:t>++) – </a:t>
+            </a:r>
+            <a:r>
+              <a:rPr lang="he-IL" dirty="0" smtClean="0"/>
+              <a:t>לולאה שרצה 5 פעמים</a:t>
+            </a:r>
+          </a:p>
+          <a:p>
+            <a:pPr algn="r" rtl="1"/>
+            <a:r>
+              <a:rPr lang="he-IL" dirty="0" smtClean="0"/>
+              <a:t>בתוך הבלוק של הלולאה, נוכל להשתמש במשתנה הספירה (</a:t>
+            </a:r>
+            <a:r>
+              <a:rPr lang="en-US" dirty="0" err="1" smtClean="0"/>
+              <a:t>i</a:t>
+            </a:r>
+            <a:r>
+              <a:rPr lang="he-IL" dirty="0" smtClean="0"/>
+              <a:t>)</a:t>
+            </a:r>
+            <a:endParaRPr lang="en-US" dirty="0" smtClean="0"/>
+          </a:p>
+          <a:p>
+            <a:pPr algn="r" rtl="1"/>
+            <a:r>
+              <a:rPr lang="he-IL" dirty="0" smtClean="0"/>
+              <a:t>נשתמש בלולאת </a:t>
+            </a:r>
+            <a:r>
+              <a:rPr lang="en-US" dirty="0" smtClean="0"/>
+              <a:t>for</a:t>
+            </a:r>
+            <a:r>
+              <a:rPr lang="he-IL" dirty="0" smtClean="0"/>
+              <a:t> בכל פעם שנדע מראש כמה ריצות נרצה </a:t>
+            </a:r>
+            <a:r>
+              <a:rPr lang="he-IL" dirty="0" err="1" smtClean="0"/>
+              <a:t>שייתבצעו</a:t>
+            </a:r>
             <a:endParaRPr lang="en-US" dirty="0"/>
           </a:p>
         </p:txBody>
@@ -7241,7 +7478,11 @@
           <a:p>
             <a:r>
               <a:rPr lang="en-US" dirty="0" smtClean="0"/>
-              <a:t>18:57</a:t>
+              <a:t>18:5</a:t>
+            </a:r>
+            <a:r>
+              <a:rPr lang="he-IL" dirty="0" smtClean="0"/>
+              <a:t>4</a:t>
             </a:r>
             <a:endParaRPr lang="en-US" dirty="0"/>
           </a:p>
@@ -7294,7 +7535,7 @@
           <a:p>
             <a:r>
               <a:rPr lang="en-US" dirty="0" smtClean="0"/>
-              <a:t>Off by 1</a:t>
+              <a:t>for loop</a:t>
             </a:r>
             <a:endParaRPr lang="en-US" dirty="0"/>
           </a:p>
@@ -7310,26 +7551,170 @@
             <p:ph idx="1"/>
           </p:nvPr>
         </p:nvSpPr>
-        <p:spPr>
-          <a:xfrm>
-            <a:off x="1103312" y="1179095"/>
-            <a:ext cx="8946541" cy="5069305"/>
-          </a:xfrm>
-        </p:spPr>
-        <p:txBody>
-          <a:bodyPr>
-            <a:normAutofit/>
-          </a:bodyPr>
+        <p:spPr/>
+        <p:txBody>
+          <a:bodyPr/>
           <a:lstStyle/>
           <a:p>
             <a:pPr algn="r" rtl="1"/>
+            <a:r>
+              <a:rPr lang="he-IL" dirty="0" smtClean="0"/>
+              <a:t>עוד כמה דוגמאות:</a:t>
+            </a:r>
+          </a:p>
+          <a:p>
+            <a:pPr lvl="1" algn="r" rtl="1"/>
+            <a:r>
+              <a:rPr lang="he-IL" dirty="0" smtClean="0"/>
+              <a:t>לולאה שרצה 4 פעמים, אבל משתנה הספירה מתחיל מ-4:</a:t>
+            </a:r>
+          </a:p>
+          <a:p>
+            <a:pPr lvl="1" algn="l"/>
+            <a:r>
+              <a:rPr lang="en-US" dirty="0" smtClean="0"/>
+              <a:t>for(</a:t>
+            </a:r>
+            <a:r>
+              <a:rPr lang="en-US" dirty="0" err="1" smtClean="0"/>
+              <a:t>int</a:t>
+            </a:r>
+            <a:r>
+              <a:rPr lang="en-US" dirty="0" smtClean="0"/>
+              <a:t> </a:t>
+            </a:r>
+            <a:r>
+              <a:rPr lang="en-US" dirty="0" err="1" smtClean="0"/>
+              <a:t>i</a:t>
+            </a:r>
+            <a:r>
+              <a:rPr lang="en-US" dirty="0" smtClean="0"/>
+              <a:t> = 4; </a:t>
+            </a:r>
+            <a:r>
+              <a:rPr lang="en-US" dirty="0" err="1" smtClean="0"/>
+              <a:t>i</a:t>
+            </a:r>
+            <a:r>
+              <a:rPr lang="en-US" dirty="0" smtClean="0"/>
+              <a:t> &lt; 8; </a:t>
+            </a:r>
+            <a:r>
+              <a:rPr lang="en-US" dirty="0" err="1" smtClean="0"/>
+              <a:t>i</a:t>
+            </a:r>
+            <a:r>
+              <a:rPr lang="en-US" dirty="0" smtClean="0"/>
+              <a:t>++)</a:t>
+            </a:r>
+          </a:p>
+          <a:p>
+            <a:pPr lvl="1" algn="r" rtl="1"/>
+            <a:r>
+              <a:rPr lang="he-IL" dirty="0" smtClean="0"/>
+              <a:t>לולאה שרצה 5 פעמים, אבל משתנה הספירה גדל ב-2 כל פעם:</a:t>
+            </a:r>
+          </a:p>
+          <a:p>
+            <a:pPr lvl="1" algn="l"/>
+            <a:r>
+              <a:rPr lang="en-US" dirty="0" smtClean="0"/>
+              <a:t>for(</a:t>
+            </a:r>
+            <a:r>
+              <a:rPr lang="en-US" dirty="0" err="1" smtClean="0"/>
+              <a:t>int</a:t>
+            </a:r>
+            <a:r>
+              <a:rPr lang="en-US" dirty="0" smtClean="0"/>
+              <a:t> </a:t>
+            </a:r>
+            <a:r>
+              <a:rPr lang="en-US" dirty="0" err="1" smtClean="0"/>
+              <a:t>i</a:t>
+            </a:r>
+            <a:r>
+              <a:rPr lang="en-US" dirty="0" smtClean="0"/>
+              <a:t> = 0; </a:t>
+            </a:r>
+            <a:r>
+              <a:rPr lang="en-US" dirty="0" err="1" smtClean="0"/>
+              <a:t>i</a:t>
+            </a:r>
+            <a:r>
+              <a:rPr lang="en-US" dirty="0" smtClean="0"/>
+              <a:t> &lt; 10; </a:t>
+            </a:r>
+            <a:r>
+              <a:rPr lang="en-US" dirty="0" err="1" smtClean="0"/>
+              <a:t>i</a:t>
+            </a:r>
+            <a:r>
+              <a:rPr lang="en-US" dirty="0" smtClean="0"/>
+              <a:t> = </a:t>
+            </a:r>
+            <a:r>
+              <a:rPr lang="en-US" dirty="0" err="1" smtClean="0"/>
+              <a:t>i</a:t>
+            </a:r>
+            <a:r>
+              <a:rPr lang="en-US" dirty="0" smtClean="0"/>
+              <a:t> + 2)</a:t>
+            </a:r>
+            <a:endParaRPr lang="he-IL" dirty="0" smtClean="0"/>
+          </a:p>
+          <a:p>
+            <a:pPr lvl="1" algn="r" rtl="1"/>
+            <a:r>
+              <a:rPr lang="he-IL" dirty="0" smtClean="0"/>
+              <a:t>לולאה שבה משתנה הספירה קטן:</a:t>
+            </a:r>
+          </a:p>
+          <a:p>
+            <a:pPr lvl="1" algn="l"/>
+            <a:r>
+              <a:rPr lang="en-US" dirty="0" smtClean="0"/>
+              <a:t>for(</a:t>
+            </a:r>
+            <a:r>
+              <a:rPr lang="en-US" dirty="0" err="1" smtClean="0"/>
+              <a:t>int</a:t>
+            </a:r>
+            <a:r>
+              <a:rPr lang="en-US" dirty="0" smtClean="0"/>
+              <a:t> </a:t>
+            </a:r>
+            <a:r>
+              <a:rPr lang="en-US" dirty="0" err="1" smtClean="0"/>
+              <a:t>i</a:t>
+            </a:r>
+            <a:r>
+              <a:rPr lang="en-US" dirty="0" smtClean="0"/>
+              <a:t> = 5; </a:t>
+            </a:r>
+            <a:r>
+              <a:rPr lang="en-US" dirty="0" err="1" smtClean="0"/>
+              <a:t>i</a:t>
+            </a:r>
+            <a:r>
+              <a:rPr lang="en-US" dirty="0" smtClean="0"/>
+              <a:t> &gt; 0; </a:t>
+            </a:r>
+            <a:r>
+              <a:rPr lang="en-US" dirty="0" err="1" smtClean="0"/>
+              <a:t>i</a:t>
+            </a:r>
+            <a:r>
+              <a:rPr lang="en-US" dirty="0" smtClean="0"/>
+              <a:t>--)</a:t>
+            </a:r>
             <a:endParaRPr lang="en-US" dirty="0"/>
           </a:p>
         </p:txBody>
       </p:sp>
       <p:sp>
         <p:nvSpPr>
-          <p:cNvPr id="6" name="Footer Placeholder 5"/>
+          <p:cNvPr id="4" name="Footer Placeholder 3"/>
           <p:cNvSpPr>
             <a:spLocks noGrp="1"/>
           </p:cNvSpPr>
@@ -7343,12 +7728,8 @@
           <a:lstStyle/>
           <a:p>
             <a:r>
-              <a:rPr lang="he-IL" dirty="0" smtClean="0"/>
-              <a:t>19:0</a:t>
-            </a:r>
-            <a:r>
               <a:rPr lang="en-US" dirty="0" smtClean="0"/>
-              <a:t>4</a:t>
+              <a:t>18:57</a:t>
             </a:r>
             <a:endParaRPr lang="en-US" dirty="0"/>
           </a:p>
@@ -7357,7 +7738,7 @@
     </p:spTree>
     <p:extLst>
       <p:ext uri="{BB962C8B-B14F-4D97-AF65-F5344CB8AC3E}">
-        <p14:creationId xmlns:p14="http://schemas.microsoft.com/office/powerpoint/2010/main" val="3516476601"/>
+        <p14:creationId xmlns:p14="http://schemas.microsoft.com/office/powerpoint/2010/main" val="2711659917"/>
       </p:ext>
     </p:extLst>
   </p:cSld>
@@ -7400,8 +7781,229 @@
           <a:lstStyle/>
           <a:p>
             <a:r>
+              <a:rPr lang="en-US" dirty="0" smtClean="0"/>
+              <a:t>Off by 1</a:t>
+            </a:r>
+            <a:endParaRPr lang="en-US" dirty="0"/>
+          </a:p>
+        </p:txBody>
+      </p:sp>
+      <p:sp>
+        <p:nvSpPr>
+          <p:cNvPr id="3" name="מציין מיקום תוכן 2"/>
+          <p:cNvSpPr>
+            <a:spLocks noGrp="1"/>
+          </p:cNvSpPr>
+          <p:nvPr>
+            <p:ph idx="1"/>
+          </p:nvPr>
+        </p:nvSpPr>
+        <p:spPr>
+          <a:xfrm>
+            <a:off x="1103312" y="1179095"/>
+            <a:ext cx="8946541" cy="5069305"/>
+          </a:xfrm>
+        </p:spPr>
+        <p:txBody>
+          <a:bodyPr>
+            <a:normAutofit/>
+          </a:bodyPr>
+          <a:lstStyle/>
+          <a:p>
+            <a:pPr algn="r" rtl="1"/>
+            <a:r>
               <a:rPr lang="he-IL" dirty="0" smtClean="0"/>
-              <a:t>יאללה, לעבוד!</a:t>
+              <a:t>מה זהה ומה שונה בלולאו</a:t>
+            </a:r>
+            <a:r>
+              <a:rPr lang="he-IL" dirty="0" smtClean="0"/>
+              <a:t>ת הבאות</a:t>
+            </a:r>
+            <a:r>
+              <a:rPr lang="en-US" dirty="0" smtClean="0"/>
+              <a:t>?</a:t>
+            </a:r>
+            <a:endParaRPr lang="he-IL" dirty="0" smtClean="0"/>
+          </a:p>
+          <a:p>
+            <a:r>
+              <a:rPr lang="en-US" dirty="0"/>
+              <a:t>for(</a:t>
+            </a:r>
+            <a:r>
+              <a:rPr lang="en-US" dirty="0" err="1"/>
+              <a:t>int</a:t>
+            </a:r>
+            <a:r>
+              <a:rPr lang="en-US" dirty="0"/>
+              <a:t> </a:t>
+            </a:r>
+            <a:r>
+              <a:rPr lang="en-US" dirty="0" err="1"/>
+              <a:t>i</a:t>
+            </a:r>
+            <a:r>
+              <a:rPr lang="en-US" dirty="0"/>
+              <a:t> = 0; </a:t>
+            </a:r>
+            <a:r>
+              <a:rPr lang="en-US" dirty="0" err="1"/>
+              <a:t>i</a:t>
+            </a:r>
+            <a:r>
+              <a:rPr lang="en-US" dirty="0"/>
+              <a:t> &lt; 5; </a:t>
+            </a:r>
+            <a:r>
+              <a:rPr lang="en-US" dirty="0" err="1"/>
+              <a:t>i</a:t>
+            </a:r>
+            <a:r>
+              <a:rPr lang="en-US" dirty="0" smtClean="0"/>
+              <a:t>++)</a:t>
+            </a:r>
+          </a:p>
+          <a:p>
+            <a:endParaRPr lang="en-US" dirty="0" smtClean="0"/>
+          </a:p>
+          <a:p>
+            <a:r>
+              <a:rPr lang="en-US" dirty="0" smtClean="0"/>
+              <a:t>for(</a:t>
+            </a:r>
+            <a:r>
+              <a:rPr lang="en-US" dirty="0" err="1" smtClean="0"/>
+              <a:t>int</a:t>
+            </a:r>
+            <a:r>
+              <a:rPr lang="en-US" dirty="0" smtClean="0"/>
+              <a:t> </a:t>
+            </a:r>
+            <a:r>
+              <a:rPr lang="en-US" dirty="0" err="1"/>
+              <a:t>i</a:t>
+            </a:r>
+            <a:r>
+              <a:rPr lang="en-US" dirty="0"/>
+              <a:t> = </a:t>
+            </a:r>
+            <a:r>
+              <a:rPr lang="en-US" dirty="0" smtClean="0"/>
+              <a:t>1; </a:t>
+            </a:r>
+            <a:r>
+              <a:rPr lang="en-US" dirty="0" err="1"/>
+              <a:t>i</a:t>
+            </a:r>
+            <a:r>
+              <a:rPr lang="en-US" dirty="0"/>
+              <a:t> &lt; 5; </a:t>
+            </a:r>
+            <a:r>
+              <a:rPr lang="en-US" dirty="0" err="1"/>
+              <a:t>i</a:t>
+            </a:r>
+            <a:r>
+              <a:rPr lang="en-US" dirty="0" smtClean="0"/>
+              <a:t>++)</a:t>
+            </a:r>
+          </a:p>
+          <a:p>
+            <a:endParaRPr lang="en-US" dirty="0" smtClean="0"/>
+          </a:p>
+          <a:p>
+            <a:r>
+              <a:rPr lang="en-US" dirty="0" smtClean="0"/>
+              <a:t>for(</a:t>
+            </a:r>
+            <a:r>
+              <a:rPr lang="en-US" dirty="0" err="1" smtClean="0"/>
+              <a:t>int</a:t>
+            </a:r>
+            <a:r>
+              <a:rPr lang="en-US" dirty="0" smtClean="0"/>
+              <a:t> </a:t>
+            </a:r>
+            <a:r>
+              <a:rPr lang="en-US" dirty="0" err="1"/>
+              <a:t>i</a:t>
+            </a:r>
+            <a:r>
+              <a:rPr lang="en-US" dirty="0"/>
+              <a:t> = 0; </a:t>
+            </a:r>
+            <a:r>
+              <a:rPr lang="en-US" dirty="0" err="1"/>
+              <a:t>i</a:t>
+            </a:r>
+            <a:r>
+              <a:rPr lang="en-US" dirty="0"/>
+              <a:t> </a:t>
+            </a:r>
+            <a:r>
+              <a:rPr lang="en-US" dirty="0" smtClean="0"/>
+              <a:t>&lt;= </a:t>
+            </a:r>
+            <a:r>
+              <a:rPr lang="en-US" dirty="0"/>
+              <a:t>5; </a:t>
+            </a:r>
+            <a:r>
+              <a:rPr lang="en-US" dirty="0" err="1"/>
+              <a:t>i</a:t>
+            </a:r>
+            <a:r>
+              <a:rPr lang="en-US" dirty="0" smtClean="0"/>
+              <a:t>++)</a:t>
+            </a:r>
+          </a:p>
+          <a:p>
+            <a:endParaRPr lang="en-US" dirty="0" smtClean="0"/>
+          </a:p>
+          <a:p>
+            <a:r>
+              <a:rPr lang="en-US" dirty="0" smtClean="0"/>
+              <a:t>for(</a:t>
+            </a:r>
+            <a:r>
+              <a:rPr lang="en-US" dirty="0" err="1" smtClean="0"/>
+              <a:t>int</a:t>
+            </a:r>
+            <a:r>
+              <a:rPr lang="en-US" dirty="0" smtClean="0"/>
+              <a:t> </a:t>
+            </a:r>
+            <a:r>
+              <a:rPr lang="en-US" dirty="0" err="1"/>
+              <a:t>i</a:t>
+            </a:r>
+            <a:r>
+              <a:rPr lang="en-US" dirty="0"/>
+              <a:t> = </a:t>
+            </a:r>
+            <a:r>
+              <a:rPr lang="en-US" dirty="0" smtClean="0"/>
+              <a:t>1; </a:t>
+            </a:r>
+            <a:r>
+              <a:rPr lang="en-US" dirty="0" err="1"/>
+              <a:t>i</a:t>
+            </a:r>
+            <a:r>
+              <a:rPr lang="en-US" dirty="0"/>
+              <a:t> &lt; </a:t>
+            </a:r>
+            <a:r>
+              <a:rPr lang="en-US" dirty="0" smtClean="0"/>
+              <a:t>6; </a:t>
+            </a:r>
+            <a:r>
+              <a:rPr lang="en-US" dirty="0" err="1"/>
+              <a:t>i</a:t>
+            </a:r>
+            <a:r>
+              <a:rPr lang="en-US" dirty="0"/>
+              <a:t>++)</a:t>
             </a:r>
             <a:endParaRPr lang="en-US" dirty="0"/>
           </a:p>
@@ -7409,26 +8011,7 @@
       </p:sp>
       <p:sp>
         <p:nvSpPr>
-          <p:cNvPr id="3" name="מציין מיקום תוכן 2"/>
-          <p:cNvSpPr>
-            <a:spLocks noGrp="1"/>
-          </p:cNvSpPr>
-          <p:nvPr>
-            <p:ph idx="1"/>
-          </p:nvPr>
-        </p:nvSpPr>
-        <p:spPr/>
-        <p:txBody>
-          <a:bodyPr/>
-          <a:lstStyle/>
-          <a:p>
-            <a:endParaRPr lang="en-US" dirty="0"/>
-          </a:p>
-        </p:txBody>
-      </p:sp>
-      <p:sp>
-        <p:nvSpPr>
-          <p:cNvPr id="4" name="Footer Placeholder 3"/>
+          <p:cNvPr id="6" name="Footer Placeholder 5"/>
           <p:cNvSpPr>
             <a:spLocks noGrp="1"/>
           </p:cNvSpPr>
@@ -7442,8 +8025,12 @@
           <a:lstStyle/>
           <a:p>
             <a:r>
+              <a:rPr lang="he-IL" dirty="0" smtClean="0"/>
+              <a:t>19:0</a:t>
+            </a:r>
+            <a:r>
               <a:rPr lang="en-US" dirty="0" smtClean="0"/>
-              <a:t>19:57</a:t>
+              <a:t>4</a:t>
             </a:r>
             <a:endParaRPr lang="en-US" dirty="0"/>
           </a:p>
@@ -7452,7 +8039,7 @@
     </p:spTree>
     <p:extLst>
       <p:ext uri="{BB962C8B-B14F-4D97-AF65-F5344CB8AC3E}">
-        <p14:creationId xmlns:p14="http://schemas.microsoft.com/office/powerpoint/2010/main" val="2696290380"/>
+        <p14:creationId xmlns:p14="http://schemas.microsoft.com/office/powerpoint/2010/main" val="3516476601"/>
       </p:ext>
     </p:extLst>
   </p:cSld>
@@ -7496,6 +8083,101 @@
           <a:p>
             <a:r>
               <a:rPr lang="he-IL" dirty="0" smtClean="0"/>
+              <a:t>יאללה, לעבוד!</a:t>
+            </a:r>
+            <a:endParaRPr lang="en-US" dirty="0"/>
+          </a:p>
+        </p:txBody>
+      </p:sp>
+      <p:sp>
+        <p:nvSpPr>
+          <p:cNvPr id="3" name="מציין מיקום תוכן 2"/>
+          <p:cNvSpPr>
+            <a:spLocks noGrp="1"/>
+          </p:cNvSpPr>
+          <p:nvPr>
+            <p:ph idx="1"/>
+          </p:nvPr>
+        </p:nvSpPr>
+        <p:spPr/>
+        <p:txBody>
+          <a:bodyPr/>
+          <a:lstStyle/>
+          <a:p>
+            <a:endParaRPr lang="en-US" dirty="0"/>
+          </a:p>
+        </p:txBody>
+      </p:sp>
+      <p:sp>
+        <p:nvSpPr>
+          <p:cNvPr id="4" name="Footer Placeholder 3"/>
+          <p:cNvSpPr>
+            <a:spLocks noGrp="1"/>
+          </p:cNvSpPr>
+          <p:nvPr>
+            <p:ph type="ftr" sz="quarter" idx="11"/>
+          </p:nvPr>
+        </p:nvSpPr>
+        <p:spPr/>
+        <p:txBody>
+          <a:bodyPr/>
+          <a:lstStyle/>
+          <a:p>
+            <a:r>
+              <a:rPr lang="en-US" dirty="0" smtClean="0"/>
+              <a:t>19:57</a:t>
+            </a:r>
+            <a:endParaRPr lang="en-US" dirty="0"/>
+          </a:p>
+        </p:txBody>
+      </p:sp>
+    </p:spTree>
+    <p:extLst>
+      <p:ext uri="{BB962C8B-B14F-4D97-AF65-F5344CB8AC3E}">
+        <p14:creationId xmlns:p14="http://schemas.microsoft.com/office/powerpoint/2010/main" val="2696290380"/>
+      </p:ext>
+    </p:extLst>
+  </p:cSld>
+  <p:clrMapOvr>
+    <a:masterClrMapping/>
+  </p:clrMapOvr>
+</p:sld>
+</file>
+
+<file path=ppt/slides/slide7.xml><?xml version="1.0" encoding="utf-8"?>
+<p:sld xmlns:a="http://schemas.openxmlformats.org/drawingml/2006/main" xmlns:r="http://schemas.openxmlformats.org/officeDocument/2006/relationships" xmlns:p="http://schemas.openxmlformats.org/presentationml/2006/main">
+  <p:cSld>
+    <p:spTree>
+      <p:nvGrpSpPr>
+        <p:cNvPr id="1" name=""/>
+        <p:cNvGrpSpPr/>
+        <p:nvPr/>
+      </p:nvGrpSpPr>
+      <p:grpSpPr>
+        <a:xfrm>
+          <a:off x="0" y="0"/>
+          <a:ext cx="0" cy="0"/>
+          <a:chOff x="0" y="0"/>
+          <a:chExt cx="0" cy="0"/>
+        </a:xfrm>
+      </p:grpSpPr>
+      <p:sp>
+        <p:nvSpPr>
+          <p:cNvPr id="2" name="כותרת 1"/>
+          <p:cNvSpPr>
+            <a:spLocks noGrp="1"/>
+          </p:cNvSpPr>
+          <p:nvPr>
+            <p:ph type="title"/>
+          </p:nvPr>
+        </p:nvSpPr>
+        <p:spPr/>
+        <p:txBody>
+          <a:bodyPr/>
+          <a:lstStyle/>
+          <a:p>
+            <a:r>
+              <a:rPr lang="he-IL" dirty="0" smtClean="0"/>
               <a:t>סיכום</a:t>
             </a:r>
             <a:endParaRPr lang="en-US" dirty="0"/>
@@ -7554,7 +8236,6 @@
               <a:rPr lang="he-IL" dirty="0" smtClean="0"/>
               <a:t> מעקב" מודפסת</a:t>
             </a:r>
-            <a:endParaRPr lang="he-IL" dirty="0" smtClean="0"/>
           </a:p>
           <a:p>
             <a:pPr lvl="1" algn="r" rtl="1"/>

</xml_diff>